<commit_message>
transcoding time and debit rate
</commit_message>
<xml_diff>
--- a/Diagms.pptx
+++ b/Diagms.pptx
@@ -265,7 +265,7 @@
           <a:p>
             <a:fld id="{D9A95A0E-5C89-4343-9AE3-3FEAAA363F24}" type="datetimeFigureOut">
               <a:rPr lang="pt-PT" smtClean="0"/>
-              <a:t>16/04/2022</a:t>
+              <a:t>12/05/2022</a:t>
             </a:fld>
             <a:endParaRPr lang="pt-PT"/>
           </a:p>
@@ -465,7 +465,7 @@
           <a:p>
             <a:fld id="{D9A95A0E-5C89-4343-9AE3-3FEAAA363F24}" type="datetimeFigureOut">
               <a:rPr lang="pt-PT" smtClean="0"/>
-              <a:t>16/04/2022</a:t>
+              <a:t>12/05/2022</a:t>
             </a:fld>
             <a:endParaRPr lang="pt-PT"/>
           </a:p>
@@ -675,7 +675,7 @@
           <a:p>
             <a:fld id="{D9A95A0E-5C89-4343-9AE3-3FEAAA363F24}" type="datetimeFigureOut">
               <a:rPr lang="pt-PT" smtClean="0"/>
-              <a:t>16/04/2022</a:t>
+              <a:t>12/05/2022</a:t>
             </a:fld>
             <a:endParaRPr lang="pt-PT"/>
           </a:p>
@@ -875,7 +875,7 @@
           <a:p>
             <a:fld id="{D9A95A0E-5C89-4343-9AE3-3FEAAA363F24}" type="datetimeFigureOut">
               <a:rPr lang="pt-PT" smtClean="0"/>
-              <a:t>16/04/2022</a:t>
+              <a:t>12/05/2022</a:t>
             </a:fld>
             <a:endParaRPr lang="pt-PT"/>
           </a:p>
@@ -1151,7 +1151,7 @@
           <a:p>
             <a:fld id="{D9A95A0E-5C89-4343-9AE3-3FEAAA363F24}" type="datetimeFigureOut">
               <a:rPr lang="pt-PT" smtClean="0"/>
-              <a:t>16/04/2022</a:t>
+              <a:t>12/05/2022</a:t>
             </a:fld>
             <a:endParaRPr lang="pt-PT"/>
           </a:p>
@@ -1419,7 +1419,7 @@
           <a:p>
             <a:fld id="{D9A95A0E-5C89-4343-9AE3-3FEAAA363F24}" type="datetimeFigureOut">
               <a:rPr lang="pt-PT" smtClean="0"/>
-              <a:t>16/04/2022</a:t>
+              <a:t>12/05/2022</a:t>
             </a:fld>
             <a:endParaRPr lang="pt-PT"/>
           </a:p>
@@ -1834,7 +1834,7 @@
           <a:p>
             <a:fld id="{D9A95A0E-5C89-4343-9AE3-3FEAAA363F24}" type="datetimeFigureOut">
               <a:rPr lang="pt-PT" smtClean="0"/>
-              <a:t>16/04/2022</a:t>
+              <a:t>12/05/2022</a:t>
             </a:fld>
             <a:endParaRPr lang="pt-PT"/>
           </a:p>
@@ -1976,7 +1976,7 @@
           <a:p>
             <a:fld id="{D9A95A0E-5C89-4343-9AE3-3FEAAA363F24}" type="datetimeFigureOut">
               <a:rPr lang="pt-PT" smtClean="0"/>
-              <a:t>16/04/2022</a:t>
+              <a:t>12/05/2022</a:t>
             </a:fld>
             <a:endParaRPr lang="pt-PT"/>
           </a:p>
@@ -2089,7 +2089,7 @@
           <a:p>
             <a:fld id="{D9A95A0E-5C89-4343-9AE3-3FEAAA363F24}" type="datetimeFigureOut">
               <a:rPr lang="pt-PT" smtClean="0"/>
-              <a:t>16/04/2022</a:t>
+              <a:t>12/05/2022</a:t>
             </a:fld>
             <a:endParaRPr lang="pt-PT"/>
           </a:p>
@@ -2402,7 +2402,7 @@
           <a:p>
             <a:fld id="{D9A95A0E-5C89-4343-9AE3-3FEAAA363F24}" type="datetimeFigureOut">
               <a:rPr lang="pt-PT" smtClean="0"/>
-              <a:t>16/04/2022</a:t>
+              <a:t>12/05/2022</a:t>
             </a:fld>
             <a:endParaRPr lang="pt-PT"/>
           </a:p>
@@ -2691,7 +2691,7 @@
           <a:p>
             <a:fld id="{D9A95A0E-5C89-4343-9AE3-3FEAAA363F24}" type="datetimeFigureOut">
               <a:rPr lang="pt-PT" smtClean="0"/>
-              <a:t>16/04/2022</a:t>
+              <a:t>12/05/2022</a:t>
             </a:fld>
             <a:endParaRPr lang="pt-PT"/>
           </a:p>
@@ -2934,7 +2934,7 @@
           <a:p>
             <a:fld id="{D9A95A0E-5C89-4343-9AE3-3FEAAA363F24}" type="datetimeFigureOut">
               <a:rPr lang="pt-PT" smtClean="0"/>
-              <a:t>16/04/2022</a:t>
+              <a:t>12/05/2022</a:t>
             </a:fld>
             <a:endParaRPr lang="pt-PT"/>
           </a:p>

</xml_diff>